<commit_message>
Finalize ppt and README.md
</commit_message>
<xml_diff>
--- a/EbenGunadi_Assignment6.pptx
+++ b/EbenGunadi_Assignment6.pptx
@@ -2810,7 +2810,7 @@
           </a:ln>
           <a:extLst>
             <a:ext uri="{C572A759-6A51-4108-AA02-DFA0A04FC94B}">
-              <ma14:wrappingTextBoxFlag xmlns="" xmlns:m="http://schemas.openxmlformats.org/officeDocument/2006/math" xmlns:a14="http://schemas.microsoft.com/office/drawing/2010/main" xmlns:ma14="http://schemas.microsoft.com/office/mac/drawingml/2011/main" val="1"/>
+              <ma14:wrappingTextBoxFlag xmlns:ma14="http://schemas.microsoft.com/office/mac/drawingml/2011/main" xmlns:a14="http://schemas.microsoft.com/office/drawing/2010/main" xmlns:m="http://schemas.openxmlformats.org/officeDocument/2006/math" xmlns="" val="1"/>
             </a:ext>
           </a:extLst>
         </p:spPr>
@@ -3297,7 +3297,7 @@
           </a:ln>
           <a:extLst>
             <a:ext uri="{C572A759-6A51-4108-AA02-DFA0A04FC94B}">
-              <ma14:wrappingTextBoxFlag xmlns="" xmlns:m="http://schemas.openxmlformats.org/officeDocument/2006/math" xmlns:a14="http://schemas.microsoft.com/office/drawing/2010/main" xmlns:ma14="http://schemas.microsoft.com/office/mac/drawingml/2011/main" val="1"/>
+              <ma14:wrappingTextBoxFlag xmlns:ma14="http://schemas.microsoft.com/office/mac/drawingml/2011/main" xmlns:a14="http://schemas.microsoft.com/office/drawing/2010/main" xmlns:m="http://schemas.openxmlformats.org/officeDocument/2006/math" xmlns="" val="1"/>
             </a:ext>
           </a:extLst>
         </p:spPr>
@@ -3901,7 +3901,7 @@
           </a:ln>
           <a:extLst>
             <a:ext uri="{C572A759-6A51-4108-AA02-DFA0A04FC94B}">
-              <ma14:wrappingTextBoxFlag xmlns="" xmlns:m="http://schemas.openxmlformats.org/officeDocument/2006/math" xmlns:a14="http://schemas.microsoft.com/office/drawing/2010/main" xmlns:ma14="http://schemas.microsoft.com/office/mac/drawingml/2011/main" val="1"/>
+              <ma14:wrappingTextBoxFlag xmlns:ma14="http://schemas.microsoft.com/office/mac/drawingml/2011/main" xmlns:a14="http://schemas.microsoft.com/office/drawing/2010/main" xmlns:m="http://schemas.openxmlformats.org/officeDocument/2006/math" xmlns="" val="1"/>
             </a:ext>
           </a:extLst>
         </p:spPr>
@@ -4364,7 +4364,7 @@
           </a:ln>
           <a:extLst>
             <a:ext uri="{C572A759-6A51-4108-AA02-DFA0A04FC94B}">
-              <ma14:wrappingTextBoxFlag xmlns="" xmlns:m="http://schemas.openxmlformats.org/officeDocument/2006/math" xmlns:a14="http://schemas.microsoft.com/office/drawing/2010/main" xmlns:ma14="http://schemas.microsoft.com/office/mac/drawingml/2011/main" val="1"/>
+              <ma14:wrappingTextBoxFlag xmlns:ma14="http://schemas.microsoft.com/office/mac/drawingml/2011/main" xmlns:a14="http://schemas.microsoft.com/office/drawing/2010/main" xmlns:m="http://schemas.openxmlformats.org/officeDocument/2006/math" xmlns="" val="1"/>
             </a:ext>
           </a:extLst>
         </p:spPr>
@@ -4808,7 +4808,7 @@
           </a:ln>
           <a:extLst>
             <a:ext uri="{C572A759-6A51-4108-AA02-DFA0A04FC94B}">
-              <ma14:wrappingTextBoxFlag xmlns="" xmlns:m="http://schemas.openxmlformats.org/officeDocument/2006/math" xmlns:a14="http://schemas.microsoft.com/office/drawing/2010/main" xmlns:ma14="http://schemas.microsoft.com/office/mac/drawingml/2011/main" val="1"/>
+              <ma14:wrappingTextBoxFlag xmlns:ma14="http://schemas.microsoft.com/office/mac/drawingml/2011/main" xmlns:a14="http://schemas.microsoft.com/office/drawing/2010/main" xmlns:m="http://schemas.openxmlformats.org/officeDocument/2006/math" xmlns="" val="1"/>
             </a:ext>
           </a:extLst>
         </p:spPr>
@@ -5266,7 +5266,7 @@
           </a:ln>
           <a:extLst>
             <a:ext uri="{C572A759-6A51-4108-AA02-DFA0A04FC94B}">
-              <ma14:wrappingTextBoxFlag xmlns="" xmlns:m="http://schemas.openxmlformats.org/officeDocument/2006/math" xmlns:a14="http://schemas.microsoft.com/office/drawing/2010/main" xmlns:ma14="http://schemas.microsoft.com/office/mac/drawingml/2011/main" val="1"/>
+              <ma14:wrappingTextBoxFlag xmlns:ma14="http://schemas.microsoft.com/office/mac/drawingml/2011/main" xmlns:a14="http://schemas.microsoft.com/office/drawing/2010/main" xmlns:m="http://schemas.openxmlformats.org/officeDocument/2006/math" xmlns="" val="1"/>
             </a:ext>
           </a:extLst>
         </p:spPr>
@@ -5904,7 +5904,7 @@
           </a:ln>
           <a:extLst>
             <a:ext uri="{C572A759-6A51-4108-AA02-DFA0A04FC94B}">
-              <ma14:wrappingTextBoxFlag xmlns="" xmlns:m="http://schemas.openxmlformats.org/officeDocument/2006/math" xmlns:a14="http://schemas.microsoft.com/office/drawing/2010/main" xmlns:ma14="http://schemas.microsoft.com/office/mac/drawingml/2011/main" val="1"/>
+              <ma14:wrappingTextBoxFlag xmlns:ma14="http://schemas.microsoft.com/office/mac/drawingml/2011/main" xmlns:a14="http://schemas.microsoft.com/office/drawing/2010/main" xmlns:m="http://schemas.openxmlformats.org/officeDocument/2006/math" xmlns="" val="1"/>
             </a:ext>
           </a:extLst>
         </p:spPr>
@@ -6203,7 +6203,7 @@
           </a:ln>
           <a:extLst>
             <a:ext uri="{C572A759-6A51-4108-AA02-DFA0A04FC94B}">
-              <ma14:wrappingTextBoxFlag xmlns="" xmlns:m="http://schemas.openxmlformats.org/officeDocument/2006/math" xmlns:a14="http://schemas.microsoft.com/office/drawing/2010/main" xmlns:ma14="http://schemas.microsoft.com/office/mac/drawingml/2011/main" val="1"/>
+              <ma14:wrappingTextBoxFlag xmlns:ma14="http://schemas.microsoft.com/office/mac/drawingml/2011/main" xmlns:a14="http://schemas.microsoft.com/office/drawing/2010/main" xmlns:m="http://schemas.openxmlformats.org/officeDocument/2006/math" xmlns="" val="1"/>
             </a:ext>
           </a:extLst>
         </p:spPr>
@@ -6458,7 +6458,7 @@
           </a:ln>
           <a:extLst>
             <a:ext uri="{C572A759-6A51-4108-AA02-DFA0A04FC94B}">
-              <ma14:wrappingTextBoxFlag xmlns="" xmlns:m="http://schemas.openxmlformats.org/officeDocument/2006/math" xmlns:a14="http://schemas.microsoft.com/office/drawing/2010/main" xmlns:ma14="http://schemas.microsoft.com/office/mac/drawingml/2011/main" val="1"/>
+              <ma14:wrappingTextBoxFlag xmlns:ma14="http://schemas.microsoft.com/office/mac/drawingml/2011/main" xmlns:a14="http://schemas.microsoft.com/office/drawing/2010/main" xmlns:m="http://schemas.openxmlformats.org/officeDocument/2006/math" xmlns="" val="1"/>
             </a:ext>
           </a:extLst>
         </p:spPr>
@@ -6969,7 +6969,7 @@
           </a:ln>
           <a:extLst>
             <a:ext uri="{C572A759-6A51-4108-AA02-DFA0A04FC94B}">
-              <ma14:wrappingTextBoxFlag xmlns="" xmlns:m="http://schemas.openxmlformats.org/officeDocument/2006/math" xmlns:a14="http://schemas.microsoft.com/office/drawing/2010/main" xmlns:ma14="http://schemas.microsoft.com/office/mac/drawingml/2011/main" val="1"/>
+              <ma14:wrappingTextBoxFlag xmlns:ma14="http://schemas.microsoft.com/office/mac/drawingml/2011/main" xmlns:a14="http://schemas.microsoft.com/office/drawing/2010/main" xmlns:m="http://schemas.openxmlformats.org/officeDocument/2006/math" xmlns="" val="1"/>
             </a:ext>
           </a:extLst>
         </p:spPr>
@@ -7456,7 +7456,7 @@
           </a:ln>
           <a:extLst>
             <a:ext uri="{C572A759-6A51-4108-AA02-DFA0A04FC94B}">
-              <ma14:wrappingTextBoxFlag xmlns="" xmlns:m="http://schemas.openxmlformats.org/officeDocument/2006/math" xmlns:a14="http://schemas.microsoft.com/office/drawing/2010/main" xmlns:ma14="http://schemas.microsoft.com/office/mac/drawingml/2011/main" val="1"/>
+              <ma14:wrappingTextBoxFlag xmlns:ma14="http://schemas.microsoft.com/office/mac/drawingml/2011/main" xmlns:a14="http://schemas.microsoft.com/office/drawing/2010/main" xmlns:m="http://schemas.openxmlformats.org/officeDocument/2006/math" xmlns="" val="1"/>
             </a:ext>
           </a:extLst>
         </p:spPr>
@@ -7919,7 +7919,7 @@
           </a:ln>
           <a:extLst>
             <a:ext uri="{C572A759-6A51-4108-AA02-DFA0A04FC94B}">
-              <ma14:wrappingTextBoxFlag xmlns="" xmlns:m="http://schemas.openxmlformats.org/officeDocument/2006/math" xmlns:a14="http://schemas.microsoft.com/office/drawing/2010/main" xmlns:ma14="http://schemas.microsoft.com/office/mac/drawingml/2011/main" val="1"/>
+              <ma14:wrappingTextBoxFlag xmlns:ma14="http://schemas.microsoft.com/office/mac/drawingml/2011/main" xmlns:a14="http://schemas.microsoft.com/office/drawing/2010/main" xmlns:m="http://schemas.openxmlformats.org/officeDocument/2006/math" xmlns="" val="1"/>
             </a:ext>
           </a:extLst>
         </p:spPr>
@@ -10177,7 +10177,7 @@
           </a:ln>
           <a:extLst>
             <a:ext uri="{C572A759-6A51-4108-AA02-DFA0A04FC94B}">
-              <ma14:wrappingTextBoxFlag xmlns="" xmlns:m="http://schemas.openxmlformats.org/officeDocument/2006/math" xmlns:a14="http://schemas.microsoft.com/office/drawing/2010/main" xmlns:ma14="http://schemas.microsoft.com/office/mac/drawingml/2011/main" val="1"/>
+              <ma14:wrappingTextBoxFlag xmlns:ma14="http://schemas.microsoft.com/office/mac/drawingml/2011/main" xmlns:a14="http://schemas.microsoft.com/office/drawing/2010/main" xmlns:m="http://schemas.openxmlformats.org/officeDocument/2006/math" xmlns="" val="1"/>
             </a:ext>
           </a:extLst>
         </p:spPr>
@@ -10664,7 +10664,7 @@
           </a:ln>
           <a:extLst>
             <a:ext uri="{C572A759-6A51-4108-AA02-DFA0A04FC94B}">
-              <ma14:wrappingTextBoxFlag xmlns="" xmlns:m="http://schemas.openxmlformats.org/officeDocument/2006/math" xmlns:a14="http://schemas.microsoft.com/office/drawing/2010/main" xmlns:ma14="http://schemas.microsoft.com/office/mac/drawingml/2011/main" val="1"/>
+              <ma14:wrappingTextBoxFlag xmlns:ma14="http://schemas.microsoft.com/office/mac/drawingml/2011/main" xmlns:a14="http://schemas.microsoft.com/office/drawing/2010/main" xmlns:m="http://schemas.openxmlformats.org/officeDocument/2006/math" xmlns="" val="1"/>
             </a:ext>
           </a:extLst>
         </p:spPr>
@@ -11345,7 +11345,7 @@
           </a:ln>
           <a:extLst>
             <a:ext uri="{C572A759-6A51-4108-AA02-DFA0A04FC94B}">
-              <ma14:wrappingTextBoxFlag xmlns="" xmlns:m="http://schemas.openxmlformats.org/officeDocument/2006/math" xmlns:a14="http://schemas.microsoft.com/office/drawing/2010/main" xmlns:ma14="http://schemas.microsoft.com/office/mac/drawingml/2011/main" val="1"/>
+              <ma14:wrappingTextBoxFlag xmlns:ma14="http://schemas.microsoft.com/office/mac/drawingml/2011/main" xmlns:a14="http://schemas.microsoft.com/office/drawing/2010/main" xmlns:m="http://schemas.openxmlformats.org/officeDocument/2006/math" xmlns="" val="1"/>
             </a:ext>
           </a:extLst>
         </p:spPr>
@@ -11808,7 +11808,7 @@
           </a:ln>
           <a:extLst>
             <a:ext uri="{C572A759-6A51-4108-AA02-DFA0A04FC94B}">
-              <ma14:wrappingTextBoxFlag xmlns="" xmlns:m="http://schemas.openxmlformats.org/officeDocument/2006/math" xmlns:a14="http://schemas.microsoft.com/office/drawing/2010/main" xmlns:ma14="http://schemas.microsoft.com/office/mac/drawingml/2011/main" val="1"/>
+              <ma14:wrappingTextBoxFlag xmlns:ma14="http://schemas.microsoft.com/office/mac/drawingml/2011/main" xmlns:a14="http://schemas.microsoft.com/office/drawing/2010/main" xmlns:m="http://schemas.openxmlformats.org/officeDocument/2006/math" xmlns="" val="1"/>
             </a:ext>
           </a:extLst>
         </p:spPr>
@@ -12252,7 +12252,7 @@
           </a:ln>
           <a:extLst>
             <a:ext uri="{C572A759-6A51-4108-AA02-DFA0A04FC94B}">
-              <ma14:wrappingTextBoxFlag xmlns="" xmlns:m="http://schemas.openxmlformats.org/officeDocument/2006/math" xmlns:a14="http://schemas.microsoft.com/office/drawing/2010/main" xmlns:ma14="http://schemas.microsoft.com/office/mac/drawingml/2011/main" val="1"/>
+              <ma14:wrappingTextBoxFlag xmlns:ma14="http://schemas.microsoft.com/office/mac/drawingml/2011/main" xmlns:a14="http://schemas.microsoft.com/office/drawing/2010/main" xmlns:m="http://schemas.openxmlformats.org/officeDocument/2006/math" xmlns="" val="1"/>
             </a:ext>
           </a:extLst>
         </p:spPr>
@@ -12710,7 +12710,7 @@
           </a:ln>
           <a:extLst>
             <a:ext uri="{C572A759-6A51-4108-AA02-DFA0A04FC94B}">
-              <ma14:wrappingTextBoxFlag xmlns="" xmlns:m="http://schemas.openxmlformats.org/officeDocument/2006/math" xmlns:a14="http://schemas.microsoft.com/office/drawing/2010/main" xmlns:ma14="http://schemas.microsoft.com/office/mac/drawingml/2011/main" val="1"/>
+              <ma14:wrappingTextBoxFlag xmlns:ma14="http://schemas.microsoft.com/office/mac/drawingml/2011/main" xmlns:a14="http://schemas.microsoft.com/office/drawing/2010/main" xmlns:m="http://schemas.openxmlformats.org/officeDocument/2006/math" xmlns="" val="1"/>
             </a:ext>
           </a:extLst>
         </p:spPr>
@@ -13222,7 +13222,7 @@
           </a:ln>
           <a:extLst>
             <a:ext uri="{C572A759-6A51-4108-AA02-DFA0A04FC94B}">
-              <ma14:wrappingTextBoxFlag xmlns="" xmlns:m="http://schemas.openxmlformats.org/officeDocument/2006/math" xmlns:a14="http://schemas.microsoft.com/office/drawing/2010/main" xmlns:ma14="http://schemas.microsoft.com/office/mac/drawingml/2011/main" val="1"/>
+              <ma14:wrappingTextBoxFlag xmlns:ma14="http://schemas.microsoft.com/office/mac/drawingml/2011/main" xmlns:a14="http://schemas.microsoft.com/office/drawing/2010/main" xmlns:m="http://schemas.openxmlformats.org/officeDocument/2006/math" xmlns="" val="1"/>
             </a:ext>
           </a:extLst>
         </p:spPr>
@@ -13521,7 +13521,7 @@
           </a:ln>
           <a:extLst>
             <a:ext uri="{C572A759-6A51-4108-AA02-DFA0A04FC94B}">
-              <ma14:wrappingTextBoxFlag xmlns="" xmlns:m="http://schemas.openxmlformats.org/officeDocument/2006/math" xmlns:a14="http://schemas.microsoft.com/office/drawing/2010/main" xmlns:ma14="http://schemas.microsoft.com/office/mac/drawingml/2011/main" val="1"/>
+              <ma14:wrappingTextBoxFlag xmlns:ma14="http://schemas.microsoft.com/office/mac/drawingml/2011/main" xmlns:a14="http://schemas.microsoft.com/office/drawing/2010/main" xmlns:m="http://schemas.openxmlformats.org/officeDocument/2006/math" xmlns="" val="1"/>
             </a:ext>
           </a:extLst>
         </p:spPr>
@@ -13776,7 +13776,7 @@
           </a:ln>
           <a:extLst>
             <a:ext uri="{C572A759-6A51-4108-AA02-DFA0A04FC94B}">
-              <ma14:wrappingTextBoxFlag xmlns="" xmlns:m="http://schemas.openxmlformats.org/officeDocument/2006/math" xmlns:a14="http://schemas.microsoft.com/office/drawing/2010/main" xmlns:ma14="http://schemas.microsoft.com/office/mac/drawingml/2011/main" val="1"/>
+              <ma14:wrappingTextBoxFlag xmlns:ma14="http://schemas.microsoft.com/office/mac/drawingml/2011/main" xmlns:a14="http://schemas.microsoft.com/office/drawing/2010/main" xmlns:m="http://schemas.openxmlformats.org/officeDocument/2006/math" xmlns="" val="1"/>
             </a:ext>
           </a:extLst>
         </p:spPr>
@@ -14287,7 +14287,7 @@
           </a:ln>
           <a:extLst>
             <a:ext uri="{C572A759-6A51-4108-AA02-DFA0A04FC94B}">
-              <ma14:wrappingTextBoxFlag xmlns="" xmlns:m="http://schemas.openxmlformats.org/officeDocument/2006/math" xmlns:a14="http://schemas.microsoft.com/office/drawing/2010/main" xmlns:ma14="http://schemas.microsoft.com/office/mac/drawingml/2011/main" val="1"/>
+              <ma14:wrappingTextBoxFlag xmlns:ma14="http://schemas.microsoft.com/office/mac/drawingml/2011/main" xmlns:a14="http://schemas.microsoft.com/office/drawing/2010/main" xmlns:m="http://schemas.openxmlformats.org/officeDocument/2006/math" xmlns="" val="1"/>
             </a:ext>
           </a:extLst>
         </p:spPr>
@@ -14774,7 +14774,7 @@
           </a:ln>
           <a:extLst>
             <a:ext uri="{C572A759-6A51-4108-AA02-DFA0A04FC94B}">
-              <ma14:wrappingTextBoxFlag xmlns="" xmlns:m="http://schemas.openxmlformats.org/officeDocument/2006/math" xmlns:a14="http://schemas.microsoft.com/office/drawing/2010/main" xmlns:ma14="http://schemas.microsoft.com/office/mac/drawingml/2011/main" val="1"/>
+              <ma14:wrappingTextBoxFlag xmlns:ma14="http://schemas.microsoft.com/office/mac/drawingml/2011/main" xmlns:a14="http://schemas.microsoft.com/office/drawing/2010/main" xmlns:m="http://schemas.openxmlformats.org/officeDocument/2006/math" xmlns="" val="1"/>
             </a:ext>
           </a:extLst>
         </p:spPr>
@@ -15237,7 +15237,7 @@
           </a:ln>
           <a:extLst>
             <a:ext uri="{C572A759-6A51-4108-AA02-DFA0A04FC94B}">
-              <ma14:wrappingTextBoxFlag xmlns="" xmlns:m="http://schemas.openxmlformats.org/officeDocument/2006/math" xmlns:a14="http://schemas.microsoft.com/office/drawing/2010/main" xmlns:ma14="http://schemas.microsoft.com/office/mac/drawingml/2011/main" val="1"/>
+              <ma14:wrappingTextBoxFlag xmlns:ma14="http://schemas.microsoft.com/office/mac/drawingml/2011/main" xmlns:a14="http://schemas.microsoft.com/office/drawing/2010/main" xmlns:m="http://schemas.openxmlformats.org/officeDocument/2006/math" xmlns="" val="1"/>
             </a:ext>
           </a:extLst>
         </p:spPr>
@@ -17557,7 +17557,7 @@
           </a:ln>
           <a:extLst>
             <a:ext uri="{C572A759-6A51-4108-AA02-DFA0A04FC94B}">
-              <ma14:wrappingTextBoxFlag xmlns="" xmlns:m="http://schemas.openxmlformats.org/officeDocument/2006/math" xmlns:a14="http://schemas.microsoft.com/office/drawing/2010/main" xmlns:ma14="http://schemas.microsoft.com/office/mac/drawingml/2011/main" val="1"/>
+              <ma14:wrappingTextBoxFlag xmlns:ma14="http://schemas.microsoft.com/office/mac/drawingml/2011/main" xmlns:a14="http://schemas.microsoft.com/office/drawing/2010/main" xmlns:m="http://schemas.openxmlformats.org/officeDocument/2006/math" xmlns="" val="1"/>
             </a:ext>
           </a:extLst>
         </p:spPr>
@@ -18044,7 +18044,7 @@
           </a:ln>
           <a:extLst>
             <a:ext uri="{C572A759-6A51-4108-AA02-DFA0A04FC94B}">
-              <ma14:wrappingTextBoxFlag xmlns="" xmlns:m="http://schemas.openxmlformats.org/officeDocument/2006/math" xmlns:a14="http://schemas.microsoft.com/office/drawing/2010/main" xmlns:ma14="http://schemas.microsoft.com/office/mac/drawingml/2011/main" val="1"/>
+              <ma14:wrappingTextBoxFlag xmlns:ma14="http://schemas.microsoft.com/office/mac/drawingml/2011/main" xmlns:a14="http://schemas.microsoft.com/office/drawing/2010/main" xmlns:m="http://schemas.openxmlformats.org/officeDocument/2006/math" xmlns="" val="1"/>
             </a:ext>
           </a:extLst>
         </p:spPr>
@@ -18648,7 +18648,7 @@
           </a:ln>
           <a:extLst>
             <a:ext uri="{C572A759-6A51-4108-AA02-DFA0A04FC94B}">
-              <ma14:wrappingTextBoxFlag xmlns="" xmlns:m="http://schemas.openxmlformats.org/officeDocument/2006/math" xmlns:a14="http://schemas.microsoft.com/office/drawing/2010/main" xmlns:ma14="http://schemas.microsoft.com/office/mac/drawingml/2011/main" val="1"/>
+              <ma14:wrappingTextBoxFlag xmlns:ma14="http://schemas.microsoft.com/office/mac/drawingml/2011/main" xmlns:a14="http://schemas.microsoft.com/office/drawing/2010/main" xmlns:m="http://schemas.openxmlformats.org/officeDocument/2006/math" xmlns="" val="1"/>
             </a:ext>
           </a:extLst>
         </p:spPr>
@@ -19111,7 +19111,7 @@
           </a:ln>
           <a:extLst>
             <a:ext uri="{C572A759-6A51-4108-AA02-DFA0A04FC94B}">
-              <ma14:wrappingTextBoxFlag xmlns="" xmlns:m="http://schemas.openxmlformats.org/officeDocument/2006/math" xmlns:a14="http://schemas.microsoft.com/office/drawing/2010/main" xmlns:ma14="http://schemas.microsoft.com/office/mac/drawingml/2011/main" val="1"/>
+              <ma14:wrappingTextBoxFlag xmlns:ma14="http://schemas.microsoft.com/office/mac/drawingml/2011/main" xmlns:a14="http://schemas.microsoft.com/office/drawing/2010/main" xmlns:m="http://schemas.openxmlformats.org/officeDocument/2006/math" xmlns="" val="1"/>
             </a:ext>
           </a:extLst>
         </p:spPr>
@@ -19555,7 +19555,7 @@
           </a:ln>
           <a:extLst>
             <a:ext uri="{C572A759-6A51-4108-AA02-DFA0A04FC94B}">
-              <ma14:wrappingTextBoxFlag xmlns="" xmlns:m="http://schemas.openxmlformats.org/officeDocument/2006/math" xmlns:a14="http://schemas.microsoft.com/office/drawing/2010/main" xmlns:ma14="http://schemas.microsoft.com/office/mac/drawingml/2011/main" val="1"/>
+              <ma14:wrappingTextBoxFlag xmlns:ma14="http://schemas.microsoft.com/office/mac/drawingml/2011/main" xmlns:a14="http://schemas.microsoft.com/office/drawing/2010/main" xmlns:m="http://schemas.openxmlformats.org/officeDocument/2006/math" xmlns="" val="1"/>
             </a:ext>
           </a:extLst>
         </p:spPr>
@@ -20013,7 +20013,7 @@
           </a:ln>
           <a:extLst>
             <a:ext uri="{C572A759-6A51-4108-AA02-DFA0A04FC94B}">
-              <ma14:wrappingTextBoxFlag xmlns="" xmlns:m="http://schemas.openxmlformats.org/officeDocument/2006/math" xmlns:a14="http://schemas.microsoft.com/office/drawing/2010/main" xmlns:ma14="http://schemas.microsoft.com/office/mac/drawingml/2011/main" val="1"/>
+              <ma14:wrappingTextBoxFlag xmlns:ma14="http://schemas.microsoft.com/office/mac/drawingml/2011/main" xmlns:a14="http://schemas.microsoft.com/office/drawing/2010/main" xmlns:m="http://schemas.openxmlformats.org/officeDocument/2006/math" xmlns="" val="1"/>
             </a:ext>
           </a:extLst>
         </p:spPr>
@@ -20525,7 +20525,7 @@
           </a:ln>
           <a:extLst>
             <a:ext uri="{C572A759-6A51-4108-AA02-DFA0A04FC94B}">
-              <ma14:wrappingTextBoxFlag xmlns="" xmlns:m="http://schemas.openxmlformats.org/officeDocument/2006/math" xmlns:a14="http://schemas.microsoft.com/office/drawing/2010/main" xmlns:ma14="http://schemas.microsoft.com/office/mac/drawingml/2011/main" val="1"/>
+              <ma14:wrappingTextBoxFlag xmlns:ma14="http://schemas.microsoft.com/office/mac/drawingml/2011/main" xmlns:a14="http://schemas.microsoft.com/office/drawing/2010/main" xmlns:m="http://schemas.openxmlformats.org/officeDocument/2006/math" xmlns="" val="1"/>
             </a:ext>
           </a:extLst>
         </p:spPr>
@@ -20824,7 +20824,7 @@
           </a:ln>
           <a:extLst>
             <a:ext uri="{C572A759-6A51-4108-AA02-DFA0A04FC94B}">
-              <ma14:wrappingTextBoxFlag xmlns="" xmlns:m="http://schemas.openxmlformats.org/officeDocument/2006/math" xmlns:a14="http://schemas.microsoft.com/office/drawing/2010/main" xmlns:ma14="http://schemas.microsoft.com/office/mac/drawingml/2011/main" val="1"/>
+              <ma14:wrappingTextBoxFlag xmlns:ma14="http://schemas.microsoft.com/office/mac/drawingml/2011/main" xmlns:a14="http://schemas.microsoft.com/office/drawing/2010/main" xmlns:m="http://schemas.openxmlformats.org/officeDocument/2006/math" xmlns="" val="1"/>
             </a:ext>
           </a:extLst>
         </p:spPr>
@@ -21324,7 +21324,7 @@
           </a:ln>
           <a:extLst>
             <a:ext uri="{C572A759-6A51-4108-AA02-DFA0A04FC94B}">
-              <ma14:wrappingTextBoxFlag xmlns="" xmlns:m="http://schemas.openxmlformats.org/officeDocument/2006/math" xmlns:a14="http://schemas.microsoft.com/office/drawing/2010/main" xmlns:ma14="http://schemas.microsoft.com/office/mac/drawingml/2011/main" val="1"/>
+              <ma14:wrappingTextBoxFlag xmlns:ma14="http://schemas.microsoft.com/office/mac/drawingml/2011/main" xmlns:a14="http://schemas.microsoft.com/office/drawing/2010/main" xmlns:m="http://schemas.openxmlformats.org/officeDocument/2006/math" xmlns="" val="1"/>
             </a:ext>
           </a:extLst>
         </p:spPr>
@@ -21835,7 +21835,7 @@
           </a:ln>
           <a:extLst>
             <a:ext uri="{C572A759-6A51-4108-AA02-DFA0A04FC94B}">
-              <ma14:wrappingTextBoxFlag xmlns="" xmlns:m="http://schemas.openxmlformats.org/officeDocument/2006/math" xmlns:a14="http://schemas.microsoft.com/office/drawing/2010/main" xmlns:ma14="http://schemas.microsoft.com/office/mac/drawingml/2011/main" val="1"/>
+              <ma14:wrappingTextBoxFlag xmlns:ma14="http://schemas.microsoft.com/office/mac/drawingml/2011/main" xmlns:a14="http://schemas.microsoft.com/office/drawing/2010/main" xmlns:m="http://schemas.openxmlformats.org/officeDocument/2006/math" xmlns="" val="1"/>
             </a:ext>
           </a:extLst>
         </p:spPr>
@@ -22322,7 +22322,7 @@
           </a:ln>
           <a:extLst>
             <a:ext uri="{C572A759-6A51-4108-AA02-DFA0A04FC94B}">
-              <ma14:wrappingTextBoxFlag xmlns="" xmlns:m="http://schemas.openxmlformats.org/officeDocument/2006/math" xmlns:a14="http://schemas.microsoft.com/office/drawing/2010/main" xmlns:ma14="http://schemas.microsoft.com/office/mac/drawingml/2011/main" val="1"/>
+              <ma14:wrappingTextBoxFlag xmlns:ma14="http://schemas.microsoft.com/office/mac/drawingml/2011/main" xmlns:a14="http://schemas.microsoft.com/office/drawing/2010/main" xmlns:m="http://schemas.openxmlformats.org/officeDocument/2006/math" xmlns="" val="1"/>
             </a:ext>
           </a:extLst>
         </p:spPr>
@@ -22785,7 +22785,7 @@
           </a:ln>
           <a:extLst>
             <a:ext uri="{C572A759-6A51-4108-AA02-DFA0A04FC94B}">
-              <ma14:wrappingTextBoxFlag xmlns="" xmlns:m="http://schemas.openxmlformats.org/officeDocument/2006/math" xmlns:a14="http://schemas.microsoft.com/office/drawing/2010/main" xmlns:ma14="http://schemas.microsoft.com/office/mac/drawingml/2011/main" val="1"/>
+              <ma14:wrappingTextBoxFlag xmlns:ma14="http://schemas.microsoft.com/office/mac/drawingml/2011/main" xmlns:a14="http://schemas.microsoft.com/office/drawing/2010/main" xmlns:m="http://schemas.openxmlformats.org/officeDocument/2006/math" xmlns="" val="1"/>
             </a:ext>
           </a:extLst>
         </p:spPr>
@@ -23363,7 +23363,7 @@
           </a:ln>
           <a:extLst>
             <a:ext uri="{C572A759-6A51-4108-AA02-DFA0A04FC94B}">
-              <ma14:wrappingTextBoxFlag xmlns="" xmlns:m="http://schemas.openxmlformats.org/officeDocument/2006/math" xmlns:a14="http://schemas.microsoft.com/office/drawing/2010/main" xmlns:ma14="http://schemas.microsoft.com/office/mac/drawingml/2011/main" val="1"/>
+              <ma14:wrappingTextBoxFlag xmlns:ma14="http://schemas.microsoft.com/office/mac/drawingml/2011/main" xmlns:a14="http://schemas.microsoft.com/office/drawing/2010/main" xmlns:m="http://schemas.openxmlformats.org/officeDocument/2006/math" xmlns="" val="1"/>
             </a:ext>
           </a:extLst>
         </p:spPr>
@@ -23402,7 +23402,7 @@
           </a:ln>
           <a:extLst>
             <a:ext uri="{C572A759-6A51-4108-AA02-DFA0A04FC94B}">
-              <ma14:wrappingTextBoxFlag xmlns="" xmlns:m="http://schemas.openxmlformats.org/officeDocument/2006/math" xmlns:a14="http://schemas.microsoft.com/office/drawing/2010/main" xmlns:ma14="http://schemas.microsoft.com/office/mac/drawingml/2011/main" val="1"/>
+              <ma14:wrappingTextBoxFlag xmlns:ma14="http://schemas.microsoft.com/office/mac/drawingml/2011/main" xmlns:a14="http://schemas.microsoft.com/office/drawing/2010/main" xmlns:m="http://schemas.openxmlformats.org/officeDocument/2006/math" xmlns="" val="1"/>
             </a:ext>
           </a:extLst>
         </p:spPr>
@@ -24379,7 +24379,7 @@
           </a:ln>
           <a:extLst>
             <a:ext uri="{C572A759-6A51-4108-AA02-DFA0A04FC94B}">
-              <ma14:wrappingTextBoxFlag xmlns="" xmlns:m="http://schemas.openxmlformats.org/officeDocument/2006/math" xmlns:a14="http://schemas.microsoft.com/office/drawing/2010/main" xmlns:ma14="http://schemas.microsoft.com/office/mac/drawingml/2011/main" val="1"/>
+              <ma14:wrappingTextBoxFlag xmlns:ma14="http://schemas.microsoft.com/office/mac/drawingml/2011/main" xmlns:a14="http://schemas.microsoft.com/office/drawing/2010/main" xmlns:m="http://schemas.openxmlformats.org/officeDocument/2006/math" xmlns="" val="1"/>
             </a:ext>
           </a:extLst>
         </p:spPr>
@@ -24466,7 +24466,7 @@
           </a:ln>
           <a:extLst>
             <a:ext uri="{C572A759-6A51-4108-AA02-DFA0A04FC94B}">
-              <ma14:wrappingTextBoxFlag xmlns="" xmlns:m="http://schemas.openxmlformats.org/officeDocument/2006/math" xmlns:a14="http://schemas.microsoft.com/office/drawing/2010/main" xmlns:ma14="http://schemas.microsoft.com/office/mac/drawingml/2011/main" val="1"/>
+              <ma14:wrappingTextBoxFlag xmlns:ma14="http://schemas.microsoft.com/office/mac/drawingml/2011/main" xmlns:a14="http://schemas.microsoft.com/office/drawing/2010/main" xmlns:m="http://schemas.openxmlformats.org/officeDocument/2006/math" xmlns="" val="1"/>
             </a:ext>
           </a:extLst>
         </p:spPr>
@@ -24513,7 +24513,7 @@
           </a:ln>
           <a:extLst>
             <a:ext uri="{C572A759-6A51-4108-AA02-DFA0A04FC94B}">
-              <ma14:wrappingTextBoxFlag xmlns="" xmlns:m="http://schemas.openxmlformats.org/officeDocument/2006/math" xmlns:a14="http://schemas.microsoft.com/office/drawing/2010/main" xmlns:ma14="http://schemas.microsoft.com/office/mac/drawingml/2011/main" val="1"/>
+              <ma14:wrappingTextBoxFlag xmlns:ma14="http://schemas.microsoft.com/office/mac/drawingml/2011/main" xmlns:a14="http://schemas.microsoft.com/office/drawing/2010/main" xmlns:m="http://schemas.openxmlformats.org/officeDocument/2006/math" xmlns="" val="1"/>
             </a:ext>
           </a:extLst>
         </p:spPr>
@@ -24586,7 +24586,7 @@
           </a:ln>
           <a:extLst>
             <a:ext uri="{C572A759-6A51-4108-AA02-DFA0A04FC94B}">
-              <ma14:wrappingTextBoxFlag xmlns="" xmlns:m="http://schemas.openxmlformats.org/officeDocument/2006/math" xmlns:a14="http://schemas.microsoft.com/office/drawing/2010/main" xmlns:ma14="http://schemas.microsoft.com/office/mac/drawingml/2011/main" val="1"/>
+              <ma14:wrappingTextBoxFlag xmlns:ma14="http://schemas.microsoft.com/office/mac/drawingml/2011/main" xmlns:a14="http://schemas.microsoft.com/office/drawing/2010/main" xmlns:m="http://schemas.openxmlformats.org/officeDocument/2006/math" xmlns="" val="1"/>
             </a:ext>
           </a:extLst>
         </p:spPr>
@@ -24633,7 +24633,7 @@
           </a:ln>
           <a:extLst>
             <a:ext uri="{C572A759-6A51-4108-AA02-DFA0A04FC94B}">
-              <ma14:wrappingTextBoxFlag xmlns="" xmlns:m="http://schemas.openxmlformats.org/officeDocument/2006/math" xmlns:a14="http://schemas.microsoft.com/office/drawing/2010/main" xmlns:ma14="http://schemas.microsoft.com/office/mac/drawingml/2011/main" val="1"/>
+              <ma14:wrappingTextBoxFlag xmlns:ma14="http://schemas.microsoft.com/office/mac/drawingml/2011/main" xmlns:a14="http://schemas.microsoft.com/office/drawing/2010/main" xmlns:m="http://schemas.openxmlformats.org/officeDocument/2006/math" xmlns="" val="1"/>
             </a:ext>
           </a:extLst>
         </p:spPr>
@@ -24760,7 +24760,7 @@
           </a:ln>
           <a:extLst>
             <a:ext uri="{C572A759-6A51-4108-AA02-DFA0A04FC94B}">
-              <ma14:wrappingTextBoxFlag xmlns="" xmlns:m="http://schemas.openxmlformats.org/officeDocument/2006/math" xmlns:a14="http://schemas.microsoft.com/office/drawing/2010/main" xmlns:ma14="http://schemas.microsoft.com/office/mac/drawingml/2011/main" val="1"/>
+              <ma14:wrappingTextBoxFlag xmlns:ma14="http://schemas.microsoft.com/office/mac/drawingml/2011/main" xmlns:a14="http://schemas.microsoft.com/office/drawing/2010/main" xmlns:m="http://schemas.openxmlformats.org/officeDocument/2006/math" xmlns="" val="1"/>
             </a:ext>
           </a:extLst>
         </p:spPr>
@@ -24807,7 +24807,7 @@
           </a:ln>
           <a:extLst>
             <a:ext uri="{C572A759-6A51-4108-AA02-DFA0A04FC94B}">
-              <ma14:wrappingTextBoxFlag xmlns="" xmlns:m="http://schemas.openxmlformats.org/officeDocument/2006/math" xmlns:a14="http://schemas.microsoft.com/office/drawing/2010/main" xmlns:ma14="http://schemas.microsoft.com/office/mac/drawingml/2011/main" val="1"/>
+              <ma14:wrappingTextBoxFlag xmlns:ma14="http://schemas.microsoft.com/office/mac/drawingml/2011/main" xmlns:a14="http://schemas.microsoft.com/office/drawing/2010/main" xmlns:m="http://schemas.openxmlformats.org/officeDocument/2006/math" xmlns="" val="1"/>
             </a:ext>
           </a:extLst>
         </p:spPr>
@@ -24987,7 +24987,13 @@
       </p:sp>
       <p:pic>
         <p:nvPicPr>
-          <p:cNvPr id="954" name="Picture 2" descr="Picture 2"/>
+          <p:cNvPr id="2" name="Picture 1">
+            <a:extLst>
+              <a:ext uri="{FF2B5EF4-FFF2-40B4-BE49-F238E27FC236}">
+                <a16:creationId xmlns:a16="http://schemas.microsoft.com/office/drawing/2014/main" id="{51BDB580-580A-DEF7-93E7-27A3F42034F8}"/>
+              </a:ext>
+            </a:extLst>
+          </p:cNvPr>
           <p:cNvPicPr>
             <a:picLocks noChangeAspect="1"/>
           </p:cNvPicPr>
@@ -25001,15 +25007,12 @@
         </p:blipFill>
         <p:spPr>
           <a:xfrm>
-            <a:off x="4083239" y="906396"/>
-            <a:ext cx="4073791" cy="3588955"/>
-          </a:xfrm>
-          <a:prstGeom prst="rect">
-            <a:avLst/>
-          </a:prstGeom>
-          <a:ln w="12700">
-            <a:miter lim="400000"/>
-          </a:ln>
+            <a:off x="4127690" y="965262"/>
+            <a:ext cx="4379843" cy="3547173"/>
+          </a:xfrm>
+          <a:prstGeom prst="rect">
+            <a:avLst/>
+          </a:prstGeom>
         </p:spPr>
       </p:pic>
     </p:spTree>
@@ -25057,7 +25060,7 @@
           </a:ln>
           <a:extLst>
             <a:ext uri="{C572A759-6A51-4108-AA02-DFA0A04FC94B}">
-              <ma14:wrappingTextBoxFlag xmlns="" xmlns:m="http://schemas.openxmlformats.org/officeDocument/2006/math" xmlns:a14="http://schemas.microsoft.com/office/drawing/2010/main" xmlns:ma14="http://schemas.microsoft.com/office/mac/drawingml/2011/main" val="1"/>
+              <ma14:wrappingTextBoxFlag xmlns:ma14="http://schemas.microsoft.com/office/mac/drawingml/2011/main" xmlns:a14="http://schemas.microsoft.com/office/drawing/2010/main" xmlns:m="http://schemas.openxmlformats.org/officeDocument/2006/math" xmlns="" val="1"/>
             </a:ext>
           </a:extLst>
         </p:spPr>
@@ -25104,7 +25107,7 @@
           </a:ln>
           <a:extLst>
             <a:ext uri="{C572A759-6A51-4108-AA02-DFA0A04FC94B}">
-              <ma14:wrappingTextBoxFlag xmlns="" xmlns:m="http://schemas.openxmlformats.org/officeDocument/2006/math" xmlns:a14="http://schemas.microsoft.com/office/drawing/2010/main" xmlns:ma14="http://schemas.microsoft.com/office/mac/drawingml/2011/main" val="1"/>
+              <ma14:wrappingTextBoxFlag xmlns:ma14="http://schemas.microsoft.com/office/mac/drawingml/2011/main" xmlns:a14="http://schemas.microsoft.com/office/drawing/2010/main" xmlns:m="http://schemas.openxmlformats.org/officeDocument/2006/math" xmlns="" val="1"/>
             </a:ext>
           </a:extLst>
         </p:spPr>
@@ -25352,7 +25355,7 @@
           </a:ln>
           <a:extLst>
             <a:ext uri="{C572A759-6A51-4108-AA02-DFA0A04FC94B}">
-              <ma14:wrappingTextBoxFlag xmlns="" xmlns:m="http://schemas.openxmlformats.org/officeDocument/2006/math" xmlns:a14="http://schemas.microsoft.com/office/drawing/2010/main" xmlns:ma14="http://schemas.microsoft.com/office/mac/drawingml/2011/main" val="1"/>
+              <ma14:wrappingTextBoxFlag xmlns:ma14="http://schemas.microsoft.com/office/mac/drawingml/2011/main" xmlns:a14="http://schemas.microsoft.com/office/drawing/2010/main" xmlns:m="http://schemas.openxmlformats.org/officeDocument/2006/math" xmlns="" val="1"/>
             </a:ext>
           </a:extLst>
         </p:spPr>
@@ -25399,7 +25402,7 @@
           </a:ln>
           <a:extLst>
             <a:ext uri="{C572A759-6A51-4108-AA02-DFA0A04FC94B}">
-              <ma14:wrappingTextBoxFlag xmlns="" xmlns:m="http://schemas.openxmlformats.org/officeDocument/2006/math" xmlns:a14="http://schemas.microsoft.com/office/drawing/2010/main" xmlns:ma14="http://schemas.microsoft.com/office/mac/drawingml/2011/main" val="1"/>
+              <ma14:wrappingTextBoxFlag xmlns:ma14="http://schemas.microsoft.com/office/mac/drawingml/2011/main" xmlns:a14="http://schemas.microsoft.com/office/drawing/2010/main" xmlns:m="http://schemas.openxmlformats.org/officeDocument/2006/math" xmlns="" val="1"/>
             </a:ext>
           </a:extLst>
         </p:spPr>
@@ -25466,6 +25469,7 @@
               <a:defRPr sz="1600"/>
             </a:pPr>
             <a:r>
+              <a:rPr dirty="0"/>
               <a:t>Bar Chart</a:t>
             </a:r>
           </a:p>
@@ -25483,9 +25487,26 @@
               <a:defRPr sz="1300" b="0"/>
             </a:pPr>
             <a:r>
-              <a:t>“py/bar-chart.py” in the GitHub repository was used to process the data</a:t>
-            </a:r>
-            <a:endParaRPr sz="1800"/>
+              <a:rPr dirty="0"/>
+              <a:t>“</a:t>
+            </a:r>
+            <a:r>
+              <a:rPr dirty="0" err="1"/>
+              <a:t>py</a:t>
+            </a:r>
+            <a:r>
+              <a:rPr dirty="0"/>
+              <a:t>/bar-</a:t>
+            </a:r>
+            <a:r>
+              <a:rPr dirty="0" err="1"/>
+              <a:t>chart.py</a:t>
+            </a:r>
+            <a:r>
+              <a:rPr dirty="0"/>
+              <a:t>” in the GitHub repository was used to process the data</a:t>
+            </a:r>
+            <a:endParaRPr sz="1800" dirty="0"/>
           </a:p>
           <a:p>
             <a:pPr marL="914400" lvl="1" indent="-330200">
@@ -25501,9 +25522,34 @@
               <a:defRPr sz="1300" b="0"/>
             </a:pPr>
             <a:r>
-              <a:t>“data/gdp_per_capita.json” is the processed data used for visualization in “js/bar-chart.js”</a:t>
-            </a:r>
-            <a:endParaRPr sz="1800"/>
+              <a:rPr dirty="0"/>
+              <a:t>“data/</a:t>
+            </a:r>
+            <a:r>
+              <a:rPr dirty="0" err="1"/>
+              <a:t>gdp_per_capita.json</a:t>
+            </a:r>
+            <a:r>
+              <a:rPr dirty="0"/>
+              <a:t>” is the processed data used for visualization in “</a:t>
+            </a:r>
+            <a:r>
+              <a:rPr dirty="0" err="1"/>
+              <a:t>js</a:t>
+            </a:r>
+            <a:r>
+              <a:rPr dirty="0"/>
+              <a:t>/bar-</a:t>
+            </a:r>
+            <a:r>
+              <a:rPr dirty="0" err="1"/>
+              <a:t>chart.js</a:t>
+            </a:r>
+            <a:r>
+              <a:rPr dirty="0"/>
+              <a:t>”</a:t>
+            </a:r>
+            <a:endParaRPr sz="1800" dirty="0"/>
           </a:p>
           <a:p>
             <a:pPr indent="-330200">
@@ -25519,7 +25565,12 @@
               <a:defRPr sz="1600"/>
             </a:pPr>
             <a:r>
-              <a:t>Bubble Chart</a:t>
+              <a:rPr lang="en-US" dirty="0"/>
+              <a:t>Line</a:t>
+            </a:r>
+            <a:r>
+              <a:rPr dirty="0"/>
+              <a:t> Chart</a:t>
             </a:r>
           </a:p>
           <a:p>
@@ -25536,9 +25587,34 @@
               <a:defRPr sz="1300" b="0"/>
             </a:pPr>
             <a:r>
-              <a:t>“py/bubble-chart.py” in the GitHub repository was used to process the data</a:t>
-            </a:r>
-            <a:endParaRPr sz="1800"/>
+              <a:rPr dirty="0"/>
+              <a:t>“</a:t>
+            </a:r>
+            <a:r>
+              <a:rPr dirty="0" err="1"/>
+              <a:t>py</a:t>
+            </a:r>
+            <a:r>
+              <a:rPr dirty="0"/>
+              <a:t>/</a:t>
+            </a:r>
+            <a:r>
+              <a:rPr lang="en-US" dirty="0"/>
+              <a:t>line</a:t>
+            </a:r>
+            <a:r>
+              <a:rPr dirty="0"/>
+              <a:t>-</a:t>
+            </a:r>
+            <a:r>
+              <a:rPr dirty="0" err="1"/>
+              <a:t>chart.py</a:t>
+            </a:r>
+            <a:r>
+              <a:rPr dirty="0"/>
+              <a:t>” in the GitHub repository was used to process the data</a:t>
+            </a:r>
+            <a:endParaRPr sz="1800" dirty="0"/>
           </a:p>
           <a:p>
             <a:pPr marL="914400" lvl="1" indent="-330200">
@@ -25554,9 +25630,42 @@
               <a:defRPr sz="1300" b="0"/>
             </a:pPr>
             <a:r>
-              <a:t>“data/population_gdp.json” is the processed data used for visualization in “js/bubble-chart.js”</a:t>
-            </a:r>
-            <a:endParaRPr sz="1800"/>
+              <a:rPr dirty="0"/>
+              <a:t>“data/</a:t>
+            </a:r>
+            <a:r>
+              <a:rPr dirty="0" err="1"/>
+              <a:t>gdp.json</a:t>
+            </a:r>
+            <a:r>
+              <a:rPr dirty="0"/>
+              <a:t>” is the processed data used for visualization in “</a:t>
+            </a:r>
+            <a:r>
+              <a:rPr dirty="0" err="1"/>
+              <a:t>js</a:t>
+            </a:r>
+            <a:r>
+              <a:rPr dirty="0"/>
+              <a:t>/</a:t>
+            </a:r>
+            <a:r>
+              <a:rPr lang="en-US" dirty="0"/>
+              <a:t>line</a:t>
+            </a:r>
+            <a:r>
+              <a:rPr dirty="0"/>
+              <a:t>-</a:t>
+            </a:r>
+            <a:r>
+              <a:rPr dirty="0" err="1"/>
+              <a:t>chart.js</a:t>
+            </a:r>
+            <a:r>
+              <a:rPr dirty="0"/>
+              <a:t>”</a:t>
+            </a:r>
+            <a:endParaRPr sz="1800" dirty="0"/>
           </a:p>
           <a:p>
             <a:pPr indent="-330200">
@@ -25572,6 +25681,7 @@
               <a:defRPr sz="1600"/>
             </a:pPr>
             <a:r>
+              <a:rPr dirty="0"/>
               <a:t>Table</a:t>
             </a:r>
           </a:p>
@@ -25589,9 +25699,26 @@
               <a:defRPr sz="1300" b="0"/>
             </a:pPr>
             <a:r>
-              <a:t>“py/table.py” in the GitHub repository was used to process the data</a:t>
-            </a:r>
-            <a:endParaRPr sz="1800"/>
+              <a:rPr dirty="0"/>
+              <a:t>“</a:t>
+            </a:r>
+            <a:r>
+              <a:rPr dirty="0" err="1"/>
+              <a:t>py</a:t>
+            </a:r>
+            <a:r>
+              <a:rPr dirty="0"/>
+              <a:t>/</a:t>
+            </a:r>
+            <a:r>
+              <a:rPr dirty="0" err="1"/>
+              <a:t>table.py</a:t>
+            </a:r>
+            <a:r>
+              <a:rPr dirty="0"/>
+              <a:t>” in the GitHub repository was used to process the data</a:t>
+            </a:r>
+            <a:endParaRPr sz="1800" dirty="0"/>
           </a:p>
           <a:p>
             <a:pPr marL="914400" lvl="1" indent="-330200">
@@ -25607,9 +25734,34 @@
               <a:defRPr sz="1300" b="0"/>
             </a:pPr>
             <a:r>
-              <a:t>“data/statistics.json” is the processed data used for visualization in “js/table.js”</a:t>
-            </a:r>
-            <a:endParaRPr sz="1800"/>
+              <a:rPr dirty="0"/>
+              <a:t>“data/</a:t>
+            </a:r>
+            <a:r>
+              <a:rPr dirty="0" err="1"/>
+              <a:t>statistics.json</a:t>
+            </a:r>
+            <a:r>
+              <a:rPr dirty="0"/>
+              <a:t>” is the processed data used for visualization in “</a:t>
+            </a:r>
+            <a:r>
+              <a:rPr dirty="0" err="1"/>
+              <a:t>js</a:t>
+            </a:r>
+            <a:r>
+              <a:rPr dirty="0"/>
+              <a:t>/</a:t>
+            </a:r>
+            <a:r>
+              <a:rPr dirty="0" err="1"/>
+              <a:t>table.js</a:t>
+            </a:r>
+            <a:r>
+              <a:rPr dirty="0"/>
+              <a:t>”</a:t>
+            </a:r>
+            <a:endParaRPr sz="1800" dirty="0"/>
           </a:p>
           <a:p>
             <a:pPr indent="-330200">
@@ -25625,8 +25777,10 @@
               <a:defRPr sz="1600"/>
             </a:pPr>
             <a:r>
-              <a:t>World Map</a:t>
-            </a:r>
+              <a:rPr lang="en-US" dirty="0"/>
+              <a:t>Scatterplot</a:t>
+            </a:r>
+            <a:endParaRPr dirty="0"/>
           </a:p>
           <a:p>
             <a:pPr marL="914400" lvl="1" indent="-330200">
@@ -25642,9 +25796,30 @@
               <a:defRPr sz="1300" b="0"/>
             </a:pPr>
             <a:r>
-              <a:t>“py/world-map.py” in the GitHub repository was used to process the data</a:t>
-            </a:r>
-            <a:endParaRPr sz="1800"/>
+              <a:rPr dirty="0"/>
+              <a:t>“</a:t>
+            </a:r>
+            <a:r>
+              <a:rPr dirty="0" err="1"/>
+              <a:t>py</a:t>
+            </a:r>
+            <a:r>
+              <a:rPr dirty="0"/>
+              <a:t>/</a:t>
+            </a:r>
+            <a:r>
+              <a:rPr lang="en-US" dirty="0" err="1"/>
+              <a:t>scatterplot</a:t>
+            </a:r>
+            <a:r>
+              <a:rPr dirty="0" err="1"/>
+              <a:t>.py</a:t>
+            </a:r>
+            <a:r>
+              <a:rPr dirty="0"/>
+              <a:t>” in the GitHub repository was used to process the data</a:t>
+            </a:r>
+            <a:endParaRPr sz="1800" dirty="0"/>
           </a:p>
           <a:p>
             <a:pPr marL="914400" lvl="1" indent="-330200">
@@ -25660,7 +25835,36 @@
               <a:defRPr sz="1300" b="0"/>
             </a:pPr>
             <a:r>
-              <a:t>“data/population_2020_circles.json” is the processed data used for visualization in “js/world-map.js”</a:t>
+              <a:rPr dirty="0"/>
+              <a:t>“data/</a:t>
+            </a:r>
+            <a:r>
+              <a:rPr dirty="0" err="1"/>
+              <a:t>population.json</a:t>
+            </a:r>
+            <a:r>
+              <a:rPr dirty="0"/>
+              <a:t>” is the processed data used for visualization in “</a:t>
+            </a:r>
+            <a:r>
+              <a:rPr dirty="0" err="1"/>
+              <a:t>js</a:t>
+            </a:r>
+            <a:r>
+              <a:rPr dirty="0"/>
+              <a:t>/</a:t>
+            </a:r>
+            <a:r>
+              <a:rPr lang="en-US" dirty="0" err="1"/>
+              <a:t>scatterplot</a:t>
+            </a:r>
+            <a:r>
+              <a:rPr dirty="0" err="1"/>
+              <a:t>.js</a:t>
+            </a:r>
+            <a:r>
+              <a:rPr dirty="0"/>
+              <a:t>”</a:t>
             </a:r>
           </a:p>
         </p:txBody>
@@ -25710,7 +25914,7 @@
           </a:ln>
           <a:extLst>
             <a:ext uri="{C572A759-6A51-4108-AA02-DFA0A04FC94B}">
-              <ma14:wrappingTextBoxFlag xmlns="" xmlns:m="http://schemas.openxmlformats.org/officeDocument/2006/math" xmlns:a14="http://schemas.microsoft.com/office/drawing/2010/main" xmlns:ma14="http://schemas.microsoft.com/office/mac/drawingml/2011/main" val="1"/>
+              <ma14:wrappingTextBoxFlag xmlns:ma14="http://schemas.microsoft.com/office/mac/drawingml/2011/main" xmlns:a14="http://schemas.microsoft.com/office/drawing/2010/main" xmlns:m="http://schemas.openxmlformats.org/officeDocument/2006/math" xmlns="" val="1"/>
             </a:ext>
           </a:extLst>
         </p:spPr>
@@ -25757,7 +25961,7 @@
           </a:ln>
           <a:extLst>
             <a:ext uri="{C572A759-6A51-4108-AA02-DFA0A04FC94B}">
-              <ma14:wrappingTextBoxFlag xmlns="" xmlns:m="http://schemas.openxmlformats.org/officeDocument/2006/math" xmlns:a14="http://schemas.microsoft.com/office/drawing/2010/main" xmlns:ma14="http://schemas.microsoft.com/office/mac/drawingml/2011/main" val="1"/>
+              <ma14:wrappingTextBoxFlag xmlns:ma14="http://schemas.microsoft.com/office/mac/drawingml/2011/main" xmlns:a14="http://schemas.microsoft.com/office/drawing/2010/main" xmlns:m="http://schemas.openxmlformats.org/officeDocument/2006/math" xmlns="" val="1"/>
             </a:ext>
           </a:extLst>
         </p:spPr>
@@ -25824,13 +26028,30 @@
               <a:defRPr sz="1600"/>
             </a:pPr>
             <a:r>
-              <a:t>"index.html" is the landing page. It can be served on a browser via hot-reload: </a:t>
-            </a:r>
-            <a:br/>
-            <a:br/>
-            <a:br/>
-            <a:br/>
-            <a:endParaRPr/>
+              <a:rPr dirty="0"/>
+              <a:t>"</a:t>
+            </a:r>
+            <a:r>
+              <a:rPr dirty="0" err="1"/>
+              <a:t>index.html</a:t>
+            </a:r>
+            <a:r>
+              <a:rPr dirty="0"/>
+              <a:t>" is the landing page. It can be served on a browser via hot-reload: </a:t>
+            </a:r>
+            <a:br>
+              <a:rPr dirty="0"/>
+            </a:br>
+            <a:br>
+              <a:rPr dirty="0"/>
+            </a:br>
+            <a:br>
+              <a:rPr dirty="0"/>
+            </a:br>
+            <a:br>
+              <a:rPr dirty="0"/>
+            </a:br>
+            <a:endParaRPr dirty="0"/>
           </a:p>
           <a:p>
             <a:pPr marL="914400" lvl="1" indent="-330200">
@@ -25846,9 +26067,10 @@
               <a:defRPr sz="1300" b="0"/>
             </a:pPr>
             <a:r>
+              <a:rPr dirty="0"/>
               <a:t>Chart titles can be clicked to view the chart on a separate HTML page	</a:t>
             </a:r>
-            <a:endParaRPr sz="1800"/>
+            <a:endParaRPr sz="1800" dirty="0"/>
           </a:p>
           <a:p>
             <a:pPr indent="-330200">
@@ -25864,10 +26086,23 @@
               <a:defRPr sz="1600"/>
             </a:pPr>
             <a:r>
-              <a:t>Alternately, this page can be viewed in GitHub at </a:t>
-            </a:r>
-            <a:r>
-              <a:rPr u="sng">
+              <a:rPr lang="en-US" dirty="0"/>
+              <a:t>Alternatively</a:t>
+            </a:r>
+            <a:r>
+              <a:rPr dirty="0"/>
+              <a:t>, this page can be viewed </a:t>
+            </a:r>
+            <a:r>
+              <a:rPr lang="en-US" dirty="0"/>
+              <a:t>on</a:t>
+            </a:r>
+            <a:r>
+              <a:rPr dirty="0"/>
+              <a:t> GitHub at </a:t>
+            </a:r>
+            <a:r>
+              <a:rPr u="sng" dirty="0">
                 <a:solidFill>
                   <a:schemeClr val="accent5"/>
                 </a:solidFill>
@@ -25878,9 +26113,38 @@
                 </a:uFill>
                 <a:hlinkClick r:id="rId2"/>
               </a:rPr>
-              <a:t>https://egunadi.github.io/dsci554-a5/</a:t>
-            </a:r>
-            <a:r>
+              <a:t>https://egunadi.github.io/dsci554-a</a:t>
+            </a:r>
+            <a:r>
+              <a:rPr lang="en-US" u="sng" dirty="0">
+                <a:solidFill>
+                  <a:schemeClr val="accent5"/>
+                </a:solidFill>
+                <a:uFill>
+                  <a:solidFill>
+                    <a:schemeClr val="accent5"/>
+                  </a:solidFill>
+                </a:uFill>
+                <a:hlinkClick r:id="rId2"/>
+              </a:rPr>
+              <a:t>6</a:t>
+            </a:r>
+            <a:r>
+              <a:rPr u="sng" dirty="0">
+                <a:solidFill>
+                  <a:schemeClr val="accent5"/>
+                </a:solidFill>
+                <a:uFill>
+                  <a:solidFill>
+                    <a:schemeClr val="accent5"/>
+                  </a:solidFill>
+                </a:uFill>
+                <a:hlinkClick r:id="rId2"/>
+              </a:rPr>
+              <a:t>/</a:t>
+            </a:r>
+            <a:r>
+              <a:rPr dirty="0"/>
               <a:t> </a:t>
             </a:r>
           </a:p>
@@ -25915,7 +26179,13 @@
       </p:pic>
       <p:pic>
         <p:nvPicPr>
-          <p:cNvPr id="968" name="Picture 3" descr="Picture 3"/>
+          <p:cNvPr id="3" name="Picture 2">
+            <a:extLst>
+              <a:ext uri="{FF2B5EF4-FFF2-40B4-BE49-F238E27FC236}">
+                <a16:creationId xmlns:a16="http://schemas.microsoft.com/office/drawing/2014/main" id="{5DECBF8A-ACB6-FB2E-4946-C8659B1E3B7E}"/>
+              </a:ext>
+            </a:extLst>
+          </p:cNvPr>
           <p:cNvPicPr>
             <a:picLocks noChangeAspect="1"/>
           </p:cNvPicPr>
@@ -25929,15 +26199,12 @@
         </p:blipFill>
         <p:spPr>
           <a:xfrm>
-            <a:off x="4478449" y="1057770"/>
-            <a:ext cx="4150046" cy="3455948"/>
-          </a:xfrm>
-          <a:prstGeom prst="rect">
-            <a:avLst/>
-          </a:prstGeom>
-          <a:ln w="12700">
-            <a:miter lim="400000"/>
-          </a:ln>
+            <a:off x="4572001" y="662754"/>
+            <a:ext cx="3532472" cy="3934660"/>
+          </a:xfrm>
+          <a:prstGeom prst="rect">
+            <a:avLst/>
+          </a:prstGeom>
         </p:spPr>
       </p:pic>
     </p:spTree>
@@ -25985,7 +26252,7 @@
           </a:ln>
           <a:extLst>
             <a:ext uri="{C572A759-6A51-4108-AA02-DFA0A04FC94B}">
-              <ma14:wrappingTextBoxFlag xmlns="" xmlns:m="http://schemas.openxmlformats.org/officeDocument/2006/math" xmlns:a14="http://schemas.microsoft.com/office/drawing/2010/main" xmlns:ma14="http://schemas.microsoft.com/office/mac/drawingml/2011/main" val="1"/>
+              <ma14:wrappingTextBoxFlag xmlns:ma14="http://schemas.microsoft.com/office/mac/drawingml/2011/main" xmlns:a14="http://schemas.microsoft.com/office/drawing/2010/main" xmlns:m="http://schemas.openxmlformats.org/officeDocument/2006/math" xmlns="" val="1"/>
             </a:ext>
           </a:extLst>
         </p:spPr>
@@ -26032,7 +26299,7 @@
           </a:ln>
           <a:extLst>
             <a:ext uri="{C572A759-6A51-4108-AA02-DFA0A04FC94B}">
-              <ma14:wrappingTextBoxFlag xmlns="" xmlns:m="http://schemas.openxmlformats.org/officeDocument/2006/math" xmlns:a14="http://schemas.microsoft.com/office/drawing/2010/main" xmlns:ma14="http://schemas.microsoft.com/office/mac/drawingml/2011/main" val="1"/>
+              <ma14:wrappingTextBoxFlag xmlns:ma14="http://schemas.microsoft.com/office/mac/drawingml/2011/main" xmlns:a14="http://schemas.microsoft.com/office/drawing/2010/main" xmlns:m="http://schemas.openxmlformats.org/officeDocument/2006/math" xmlns="" val="1"/>
             </a:ext>
           </a:extLst>
         </p:spPr>
@@ -26099,13 +26366,18 @@
               <a:defRPr sz="1300" b="0"/>
             </a:pPr>
             <a:r>
-              <a:t>Bubbles and bars are </a:t>
-            </a:r>
-            <a:r>
-              <a:rPr i="1"/>
+              <a:rPr lang="en-US" dirty="0"/>
+              <a:t>Lines, dots,</a:t>
+            </a:r>
+            <a:r>
+              <a:rPr dirty="0"/>
+              <a:t> and bars are </a:t>
+            </a:r>
+            <a:r>
+              <a:rPr i="1" dirty="0"/>
               <a:t>abstractions</a:t>
             </a:r>
-            <a:endParaRPr sz="1800"/>
+            <a:endParaRPr sz="1800" dirty="0"/>
           </a:p>
           <a:p>
             <a:pPr marL="927100" lvl="1" indent="-342900">
@@ -26121,16 +26393,18 @@
               <a:defRPr sz="1300" b="0"/>
             </a:pPr>
             <a:r>
+              <a:rPr dirty="0"/>
               <a:t>All </a:t>
             </a:r>
             <a:r>
-              <a:rPr i="1"/>
+              <a:rPr i="1" dirty="0"/>
               <a:t>functionality </a:t>
             </a:r>
             <a:r>
+              <a:rPr dirty="0"/>
               <a:t>with no decoration</a:t>
             </a:r>
-            <a:endParaRPr sz="1800"/>
+            <a:endParaRPr sz="1800" dirty="0"/>
           </a:p>
           <a:p>
             <a:pPr marL="927100" lvl="1" indent="-342900">
@@ -26146,16 +26420,18 @@
               <a:defRPr sz="1300" b="0"/>
             </a:pPr>
             <a:r>
+              <a:rPr dirty="0"/>
               <a:t>Lots of </a:t>
             </a:r>
             <a:r>
-              <a:rPr i="1"/>
+              <a:rPr i="1" dirty="0"/>
               <a:t>density </a:t>
             </a:r>
             <a:r>
+              <a:rPr dirty="0"/>
               <a:t>with text and charts dominating space</a:t>
             </a:r>
-            <a:endParaRPr sz="1800"/>
+            <a:endParaRPr sz="1800" dirty="0"/>
           </a:p>
           <a:p>
             <a:pPr marL="927100" lvl="1" indent="-342900">
@@ -26171,16 +26447,18 @@
               <a:defRPr sz="1300" b="0"/>
             </a:pPr>
             <a:r>
+              <a:rPr dirty="0"/>
               <a:t>Contains both tabular data and diagrams (</a:t>
             </a:r>
             <a:r>
-              <a:rPr i="1"/>
+              <a:rPr i="1" dirty="0"/>
               <a:t>multidimensionality</a:t>
             </a:r>
             <a:r>
+              <a:rPr dirty="0"/>
               <a:t>)</a:t>
             </a:r>
-            <a:endParaRPr sz="1800"/>
+            <a:endParaRPr sz="1800" dirty="0"/>
           </a:p>
           <a:p>
             <a:pPr marL="927100" lvl="1" indent="-342900">
@@ -26196,16 +26474,18 @@
               <a:defRPr sz="1300" b="0"/>
             </a:pPr>
             <a:r>
+              <a:rPr dirty="0"/>
               <a:t>Users will have </a:t>
             </a:r>
             <a:r>
-              <a:rPr i="1"/>
+              <a:rPr i="1" dirty="0"/>
               <a:t>familiarity </a:t>
             </a:r>
             <a:r>
+              <a:rPr dirty="0"/>
               <a:t>with the standard four-by-four layout used</a:t>
             </a:r>
-            <a:endParaRPr sz="1800"/>
+            <a:endParaRPr sz="1800" dirty="0"/>
           </a:p>
           <a:p>
             <a:pPr marL="927100" lvl="1" indent="-342900">
@@ -26221,20 +26501,23 @@
               <a:defRPr sz="1300" b="0"/>
             </a:pPr>
             <a:r>
+              <a:rPr dirty="0"/>
               <a:t>While each visualization is unique in form or has </a:t>
             </a:r>
             <a:r>
-              <a:rPr i="1"/>
+              <a:rPr i="1" dirty="0"/>
               <a:t>novelty</a:t>
             </a:r>
             <a:r>
+              <a:rPr dirty="0"/>
               <a:t>, there is also </a:t>
             </a:r>
             <a:r>
-              <a:rPr i="1"/>
+              <a:rPr i="1" dirty="0"/>
               <a:t>redundancy</a:t>
             </a:r>
             <a:r>
+              <a:rPr dirty="0"/>
               <a:t> since they present variance of the same underlying data</a:t>
             </a:r>
           </a:p>
@@ -26242,7 +26525,13 @@
       </p:sp>
       <p:pic>
         <p:nvPicPr>
-          <p:cNvPr id="973" name="Picture 2" descr="Picture 2"/>
+          <p:cNvPr id="2" name="Picture 1">
+            <a:extLst>
+              <a:ext uri="{FF2B5EF4-FFF2-40B4-BE49-F238E27FC236}">
+                <a16:creationId xmlns:a16="http://schemas.microsoft.com/office/drawing/2014/main" id="{BE465A5D-6F45-8347-499B-0C6D3A1AF283}"/>
+              </a:ext>
+            </a:extLst>
+          </p:cNvPr>
           <p:cNvPicPr>
             <a:picLocks noChangeAspect="1"/>
           </p:cNvPicPr>
@@ -26256,15 +26545,12 @@
         </p:blipFill>
         <p:spPr>
           <a:xfrm>
-            <a:off x="4478449" y="1057770"/>
-            <a:ext cx="4150046" cy="3455948"/>
-          </a:xfrm>
-          <a:prstGeom prst="rect">
-            <a:avLst/>
-          </a:prstGeom>
-          <a:ln w="12700">
-            <a:miter lim="400000"/>
-          </a:ln>
+            <a:off x="4572001" y="662754"/>
+            <a:ext cx="3532472" cy="3934660"/>
+          </a:xfrm>
+          <a:prstGeom prst="rect">
+            <a:avLst/>
+          </a:prstGeom>
         </p:spPr>
       </p:pic>
     </p:spTree>
@@ -26312,7 +26598,7 @@
           </a:ln>
           <a:extLst>
             <a:ext uri="{C572A759-6A51-4108-AA02-DFA0A04FC94B}">
-              <ma14:wrappingTextBoxFlag xmlns="" xmlns:m="http://schemas.openxmlformats.org/officeDocument/2006/math" xmlns:a14="http://schemas.microsoft.com/office/drawing/2010/main" xmlns:ma14="http://schemas.microsoft.com/office/mac/drawingml/2011/main" val="1"/>
+              <ma14:wrappingTextBoxFlag xmlns:ma14="http://schemas.microsoft.com/office/mac/drawingml/2011/main" xmlns:a14="http://schemas.microsoft.com/office/drawing/2010/main" xmlns:m="http://schemas.openxmlformats.org/officeDocument/2006/math" xmlns="" val="1"/>
             </a:ext>
           </a:extLst>
         </p:spPr>
@@ -26359,7 +26645,7 @@
           </a:ln>
           <a:extLst>
             <a:ext uri="{C572A759-6A51-4108-AA02-DFA0A04FC94B}">
-              <ma14:wrappingTextBoxFlag xmlns="" xmlns:m="http://schemas.openxmlformats.org/officeDocument/2006/math" xmlns:a14="http://schemas.microsoft.com/office/drawing/2010/main" xmlns:ma14="http://schemas.microsoft.com/office/mac/drawingml/2011/main" val="1"/>
+              <ma14:wrappingTextBoxFlag xmlns:ma14="http://schemas.microsoft.com/office/mac/drawingml/2011/main" xmlns:a14="http://schemas.microsoft.com/office/drawing/2010/main" xmlns:m="http://schemas.openxmlformats.org/officeDocument/2006/math" xmlns="" val="1"/>
             </a:ext>
           </a:extLst>
         </p:spPr>
@@ -26392,7 +26678,7 @@
       </p:sp>
       <p:pic>
         <p:nvPicPr>
-          <p:cNvPr id="977" name="Picture 2" descr="Picture 2"/>
+          <p:cNvPr id="978" name="Graphic 9" descr="Graphic 9"/>
           <p:cNvPicPr>
             <a:picLocks noChangeAspect="1"/>
           </p:cNvPicPr>
@@ -26406,8 +26692,8 @@
         </p:blipFill>
         <p:spPr>
           <a:xfrm>
-            <a:off x="4478449" y="1057770"/>
-            <a:ext cx="4150046" cy="3455948"/>
+            <a:off x="404899" y="843776"/>
+            <a:ext cx="3536464" cy="3455948"/>
           </a:xfrm>
           <a:prstGeom prst="rect">
             <a:avLst/>
@@ -26419,7 +26705,13 @@
       </p:pic>
       <p:pic>
         <p:nvPicPr>
-          <p:cNvPr id="978" name="Graphic 9" descr="Graphic 9"/>
+          <p:cNvPr id="2" name="Picture 1">
+            <a:extLst>
+              <a:ext uri="{FF2B5EF4-FFF2-40B4-BE49-F238E27FC236}">
+                <a16:creationId xmlns:a16="http://schemas.microsoft.com/office/drawing/2014/main" id="{DE0D4DE0-8FDF-BC37-CEAF-DEE42E67C89D}"/>
+              </a:ext>
+            </a:extLst>
+          </p:cNvPr>
           <p:cNvPicPr>
             <a:picLocks noChangeAspect="1"/>
           </p:cNvPicPr>
@@ -26433,15 +26725,12 @@
         </p:blipFill>
         <p:spPr>
           <a:xfrm>
-            <a:off x="404899" y="843776"/>
-            <a:ext cx="3536464" cy="3455948"/>
-          </a:xfrm>
-          <a:prstGeom prst="rect">
-            <a:avLst/>
-          </a:prstGeom>
-          <a:ln w="12700">
-            <a:miter lim="400000"/>
-          </a:ln>
+            <a:off x="4572001" y="662754"/>
+            <a:ext cx="3532472" cy="3934660"/>
+          </a:xfrm>
+          <a:prstGeom prst="rect">
+            <a:avLst/>
+          </a:prstGeom>
         </p:spPr>
       </p:pic>
     </p:spTree>

</xml_diff>